<commit_message>
Sequenzdiagramm Update, Task07 Doku Update
</commit_message>
<xml_diff>
--- a/doc/Task07/Task07.pptx
+++ b/doc/Task07/Task07.pptx
@@ -1,6 +1,6 @@
 
 <file path=ppt/presentation.xml><?xml version="1.0" encoding="utf-8"?>
-<p:presentation xmlns:a="http://schemas.openxmlformats.org/drawingml/2006/main" xmlns:r="http://schemas.openxmlformats.org/officeDocument/2006/relationships" xmlns:p="http://schemas.openxmlformats.org/presentationml/2006/main" serverZoom="10743" saveSubsetFonts="1" autoCompressPictures="0">
+<p:presentation xmlns:a="http://schemas.openxmlformats.org/drawingml/2006/main" xmlns:r="http://schemas.openxmlformats.org/officeDocument/2006/relationships" xmlns:p="http://schemas.openxmlformats.org/presentationml/2006/main" serverZoom="17105" saveSubsetFonts="1" autoCompressPictures="0">
   <p:sldMasterIdLst>
     <p:sldMasterId id="2147483669" r:id="rId4"/>
   </p:sldMasterIdLst>
@@ -148,7 +148,7 @@
   </p:defaultTextStyle>
   <p:extLst>
     <p:ext uri="{EFAFB233-063F-42B5-8137-9DF3F51BA10A}">
-      <p15:sldGuideLst xmlns:p15="http://schemas.microsoft.com/office/powerpoint/2012/main">
+      <p15:sldGuideLst xmlns="" xmlns:p15="http://schemas.microsoft.com/office/powerpoint/2012/main">
         <p15:guide id="1" orient="horz" pos="2160">
           <p15:clr>
             <a:srgbClr val="A4A3A4"/>
@@ -162,7 +162,7 @@
       </p15:sldGuideLst>
     </p:ext>
     <p:ext uri="{2D200454-40CA-4A62-9FC3-DE9A4176ACB9}">
-      <p15:notesGuideLst xmlns:p15="http://schemas.microsoft.com/office/powerpoint/2012/main">
+      <p15:notesGuideLst xmlns="" xmlns:p15="http://schemas.microsoft.com/office/powerpoint/2012/main">
         <p15:guide id="1" orient="horz" pos="3127">
           <p15:clr>
             <a:srgbClr val="A4A3A4"/>
@@ -261,7 +261,7 @@
           <a:p>
             <a:fld id="{EFA0D184-D464-48E9-9CA0-A94E873F6C2C}" type="datetimeFigureOut">
               <a:rPr lang="de-CH" smtClean="0"/>
-              <a:t>06.11.2015</a:t>
+              <a:t>09.11.2015</a:t>
             </a:fld>
             <a:endParaRPr lang="de-CH" dirty="0"/>
           </a:p>
@@ -426,7 +426,7 @@
           <a:p>
             <a:fld id="{5AF2B663-2BA9-4D7E-8201-5DE4109E1EDD}" type="datetimeFigureOut">
               <a:rPr lang="de-CH" smtClean="0"/>
-              <a:t>06.11.2015</a:t>
+              <a:t>09.11.2015</a:t>
             </a:fld>
             <a:endParaRPr lang="de-CH" dirty="0"/>
           </a:p>
@@ -2299,7 +2299,7 @@
           <a:p>
             <a:fld id="{BA759448-4020-4154-96C5-32359420A77A}" type="datetimeFigureOut">
               <a:rPr lang="de-CH" smtClean="0"/>
-              <a:t>06.11.2015</a:t>
+              <a:t>09.11.2015</a:t>
             </a:fld>
             <a:endParaRPr lang="de-CH"/>
           </a:p>
@@ -2410,7 +2410,7 @@
           <a:p>
             <a:fld id="{C768754E-A360-45E9-84D1-79DBC472E63F}" type="datetimeFigureOut">
               <a:rPr lang="de-CH" smtClean="0"/>
-              <a:t>06.11.2015</a:t>
+              <a:t>09.11.2015</a:t>
             </a:fld>
             <a:endParaRPr lang="de-CH"/>
           </a:p>
@@ -6967,7 +6967,11 @@
           <a:p>
             <a:r>
               <a:rPr lang="de-CH" b="1" dirty="0" smtClean="0"/>
-              <a:t>09.11.2015, Schmocker, Noser, Tschanz, Zysset, Iseli, Schmied</a:t>
+              <a:t>09.11.2015, Schmocker, Noser, Tschanz, Zysset, </a:t>
+            </a:r>
+            <a:r>
+              <a:rPr lang="de-CH" b="1" smtClean="0"/>
+              <a:t>Iseli</a:t>
             </a:r>
             <a:endParaRPr lang="de-DE" b="1" dirty="0"/>
           </a:p>
@@ -6991,10 +6995,6 @@
           <a:bodyPr/>
           <a:lstStyle/>
           <a:p>
-            <a:r>
-              <a:rPr lang="de-CH" dirty="0" smtClean="0"/>
-              <a:t>Technik und Informatik / Medizininformatik</a:t>
-            </a:r>
             <a:endParaRPr lang="de-CH" dirty="0"/>
           </a:p>
         </p:txBody>
@@ -7276,8 +7276,8 @@
               <a:t>Erstellen eines neuen </a:t>
             </a:r>
             <a:r>
-              <a:rPr lang="de-CH" dirty="0" smtClean="0"/>
-              <a:t>Termins</a:t>
+              <a:rPr lang="de-CH" dirty="0" err="1" smtClean="0"/>
+              <a:t>Termines</a:t>
             </a:r>
             <a:endParaRPr lang="de-CH" dirty="0"/>
           </a:p>
@@ -7285,7 +7285,7 @@
       </p:sp>
       <p:pic>
         <p:nvPicPr>
-          <p:cNvPr id="3074" name="Picture 2" descr="C:\Users\Maurice\Desktop\Bild3.png"/>
+          <p:cNvPr id="2050" name="Picture 2"/>
           <p:cNvPicPr>
             <a:picLocks noChangeAspect="1" noChangeArrowheads="1"/>
           </p:cNvPicPr>
@@ -7306,20 +7306,33 @@
         </p:blipFill>
         <p:spPr bwMode="auto">
           <a:xfrm>
-            <a:off x="1634836" y="737028"/>
-            <a:ext cx="5749638" cy="5385999"/>
+            <a:off x="1302434" y="900000"/>
+            <a:ext cx="6280052" cy="5297026"/>
           </a:xfrm>
           <a:prstGeom prst="rect">
             <a:avLst/>
           </a:prstGeom>
           <a:noFill/>
+          <a:ln>
+            <a:noFill/>
+          </a:ln>
           <a:extLst>
             <a:ext uri="{909E8E84-426E-40DD-AFC4-6F175D3DCCD1}">
               <a14:hiddenFill xmlns:a14="http://schemas.microsoft.com/office/drawing/2010/main">
                 <a:solidFill>
-                  <a:srgbClr val="FFFFFF"/>
+                  <a:schemeClr val="accent1"/>
                 </a:solidFill>
               </a14:hiddenFill>
+            </a:ext>
+            <a:ext uri="{91240B29-F687-4F45-9708-019B960494DF}">
+              <a14:hiddenLine xmlns:a14="http://schemas.microsoft.com/office/drawing/2010/main" w="9525">
+                <a:solidFill>
+                  <a:schemeClr val="tx1"/>
+                </a:solidFill>
+                <a:miter lim="800000"/>
+                <a:headEnd/>
+                <a:tailEnd/>
+              </a14:hiddenLine>
             </a:ext>
           </a:extLst>
         </p:spPr>
@@ -7386,7 +7399,7 @@
       </p:sp>
       <p:pic>
         <p:nvPicPr>
-          <p:cNvPr id="4098" name="Picture 2" descr="C:\Users\Maurice\Desktop\Bild4.png"/>
+          <p:cNvPr id="1027" name="Picture 3"/>
           <p:cNvPicPr>
             <a:picLocks noChangeAspect="1" noChangeArrowheads="1"/>
           </p:cNvPicPr>
@@ -7407,20 +7420,33 @@
         </p:blipFill>
         <p:spPr bwMode="auto">
           <a:xfrm>
-            <a:off x="1451704" y="858434"/>
-            <a:ext cx="6833345" cy="5638771"/>
+            <a:off x="1310448" y="864943"/>
+            <a:ext cx="5723397" cy="5432869"/>
           </a:xfrm>
           <a:prstGeom prst="rect">
             <a:avLst/>
           </a:prstGeom>
           <a:noFill/>
+          <a:ln>
+            <a:noFill/>
+          </a:ln>
           <a:extLst>
             <a:ext uri="{909E8E84-426E-40DD-AFC4-6F175D3DCCD1}">
               <a14:hiddenFill xmlns:a14="http://schemas.microsoft.com/office/drawing/2010/main">
                 <a:solidFill>
-                  <a:srgbClr val="FFFFFF"/>
+                  <a:schemeClr val="accent1"/>
                 </a:solidFill>
               </a14:hiddenFill>
+            </a:ext>
+            <a:ext uri="{91240B29-F687-4F45-9708-019B960494DF}">
+              <a14:hiddenLine xmlns:a14="http://schemas.microsoft.com/office/drawing/2010/main" w="9525">
+                <a:solidFill>
+                  <a:schemeClr val="tx1"/>
+                </a:solidFill>
+                <a:miter lim="800000"/>
+                <a:headEnd/>
+                <a:tailEnd/>
+              </a14:hiddenLine>
             </a:ext>
           </a:extLst>
         </p:spPr>
@@ -7483,7 +7509,7 @@
             </a:r>
             <a:r>
               <a:rPr lang="de-CH" dirty="0" err="1" smtClean="0"/>
-              <a:t>extended</a:t>
+              <a:t>extendet</a:t>
             </a:r>
             <a:endParaRPr lang="de-CH" dirty="0"/>
           </a:p>
@@ -8451,23 +8477,6 @@
 </file>
 
 <file path=customXml/item1.xml><?xml version="1.0" encoding="utf-8"?>
-<p:properties xmlns:p="http://schemas.microsoft.com/office/2006/metadata/properties" xmlns:xsi="http://www.w3.org/2001/XMLSchema-instance">
-  <documentManagement>
-    <AVMTitle xmlns="5091c847-84be-4f4f-b16c-c018ad2ca66b">Präsentation BFH_2013</AVMTitle>
-  </documentManagement>
-</p:properties>
-</file>
-
-<file path=customXml/item2.xml><?xml version="1.0" encoding="utf-8"?>
-<?mso-contentType ?>
-<FormTemplates xmlns="http://schemas.microsoft.com/sharepoint/v3/contenttype/forms">
-  <Display>DocumentLibraryForm</Display>
-  <Edit>DocumentLibraryForm</Edit>
-  <New>DocumentLibraryForm</New>
-</FormTemplates>
-</file>
-
-<file path=customXml/item3.xml><?xml version="1.0" encoding="utf-8"?>
 <ct:contentTypeSchema xmlns:ct="http://schemas.microsoft.com/office/2006/metadata/contentType" xmlns:ma="http://schemas.microsoft.com/office/2006/metadata/properties/metaAttributes" ct:_="" ma:_="" ma:contentTypeName="Dokument" ma:contentTypeID="0x010100EBE3A9EFF36793468C03E2811ACE2A2B" ma:contentTypeVersion="1" ma:contentTypeDescription="Ein neues Dokument erstellen." ma:contentTypeScope="" ma:versionID="e65be32cb1bfff77fc8c9c09bf542651">
   <xsd:schema xmlns:xsd="http://www.w3.org/2001/XMLSchema" xmlns:p="http://schemas.microsoft.com/office/2006/metadata/properties" xmlns:ns2="5091c847-84be-4f4f-b16c-c018ad2ca66b" targetNamespace="http://schemas.microsoft.com/office/2006/metadata/properties" ma:root="true" ma:fieldsID="7636c84aed5b7d09a166fcef888725d4" ns2:_="">
     <xsd:import namespace="5091c847-84be-4f4f-b16c-c018ad2ca66b"/>
@@ -8527,30 +8536,24 @@
 </ct:contentTypeSchema>
 </file>
 
-<file path=customXml/itemProps1.xml><?xml version="1.0" encoding="utf-8"?>
-<ds:datastoreItem xmlns:ds="http://schemas.openxmlformats.org/officeDocument/2006/customXml" ds:itemID="{32991507-CB83-4F49-BAFB-D322B1D04098}">
-  <ds:schemaRefs>
-    <ds:schemaRef ds:uri="http://schemas.microsoft.com/office/2006/documentManagement/types"/>
-    <ds:schemaRef ds:uri="http://purl.org/dc/dcmitype/"/>
-    <ds:schemaRef ds:uri="5091c847-84be-4f4f-b16c-c018ad2ca66b"/>
-    <ds:schemaRef ds:uri="http://schemas.microsoft.com/office/2006/metadata/properties"/>
-    <ds:schemaRef ds:uri="http://www.w3.org/XML/1998/namespace"/>
-    <ds:schemaRef ds:uri="http://purl.org/dc/elements/1.1/"/>
-    <ds:schemaRef ds:uri="http://schemas.openxmlformats.org/package/2006/metadata/core-properties"/>
-    <ds:schemaRef ds:uri="http://purl.org/dc/terms/"/>
-  </ds:schemaRefs>
-</ds:datastoreItem>
+<file path=customXml/item2.xml><?xml version="1.0" encoding="utf-8"?>
+<?mso-contentType ?>
+<FormTemplates xmlns="http://schemas.microsoft.com/sharepoint/v3/contenttype/forms">
+  <Display>DocumentLibraryForm</Display>
+  <Edit>DocumentLibraryForm</Edit>
+  <New>DocumentLibraryForm</New>
+</FormTemplates>
 </file>
 
-<file path=customXml/itemProps2.xml><?xml version="1.0" encoding="utf-8"?>
-<ds:datastoreItem xmlns:ds="http://schemas.openxmlformats.org/officeDocument/2006/customXml" ds:itemID="{1851D33F-E468-417B-A30C-509B68D2BD09}">
-  <ds:schemaRefs>
-    <ds:schemaRef ds:uri="http://schemas.microsoft.com/sharepoint/v3/contenttype/forms"/>
-  </ds:schemaRefs>
-</ds:datastoreItem>
+<file path=customXml/item3.xml><?xml version="1.0" encoding="utf-8"?>
+<p:properties xmlns:p="http://schemas.microsoft.com/office/2006/metadata/properties" xmlns:xsi="http://www.w3.org/2001/XMLSchema-instance">
+  <documentManagement>
+    <AVMTitle xmlns="5091c847-84be-4f4f-b16c-c018ad2ca66b">Präsentation BFH_2013</AVMTitle>
+  </documentManagement>
+</p:properties>
 </file>
 
-<file path=customXml/itemProps3.xml><?xml version="1.0" encoding="utf-8"?>
+<file path=customXml/itemProps1.xml><?xml version="1.0" encoding="utf-8"?>
 <ds:datastoreItem xmlns:ds="http://schemas.openxmlformats.org/officeDocument/2006/customXml" ds:itemID="{15287BEA-F3FF-4B87-929B-5D0092183197}">
   <ds:schemaRefs>
     <ds:schemaRef ds:uri="http://schemas.microsoft.com/office/2006/metadata/contentType"/>
@@ -8565,4 +8568,27 @@
     <ds:schemaRef ds:uri="http://schemas.microsoft.com/office/internal/2005/internalDocumentation"/>
   </ds:schemaRefs>
 </ds:datastoreItem>
+</file>
+
+<file path=customXml/itemProps2.xml><?xml version="1.0" encoding="utf-8"?>
+<ds:datastoreItem xmlns:ds="http://schemas.openxmlformats.org/officeDocument/2006/customXml" ds:itemID="{1851D33F-E468-417B-A30C-509B68D2BD09}">
+  <ds:schemaRefs>
+    <ds:schemaRef ds:uri="http://schemas.microsoft.com/sharepoint/v3/contenttype/forms"/>
+  </ds:schemaRefs>
+</ds:datastoreItem>
+</file>
+
+<file path=customXml/itemProps3.xml><?xml version="1.0" encoding="utf-8"?>
+<ds:datastoreItem xmlns:ds="http://schemas.openxmlformats.org/officeDocument/2006/customXml" ds:itemID="{32991507-CB83-4F49-BAFB-D322B1D04098}">
+  <ds:schemaRefs>
+    <ds:schemaRef ds:uri="http://schemas.microsoft.com/office/2006/documentManagement/types"/>
+    <ds:schemaRef ds:uri="http://purl.org/dc/dcmitype/"/>
+    <ds:schemaRef ds:uri="5091c847-84be-4f4f-b16c-c018ad2ca66b"/>
+    <ds:schemaRef ds:uri="http://schemas.microsoft.com/office/2006/metadata/properties"/>
+    <ds:schemaRef ds:uri="http://www.w3.org/XML/1998/namespace"/>
+    <ds:schemaRef ds:uri="http://purl.org/dc/elements/1.1/"/>
+    <ds:schemaRef ds:uri="http://schemas.openxmlformats.org/package/2006/metadata/core-properties"/>
+    <ds:schemaRef ds:uri="http://purl.org/dc/terms/"/>
+  </ds:schemaRefs>
+</ds:datastoreItem>
 </file>
</xml_diff>